<commit_message>
add funding acknowledgemet and some gridlines to software fellow poster template
</commit_message>
<xml_diff>
--- a/powerpoint_template/software_fellow_poster_template.pptx
+++ b/powerpoint_template/software_fellow_poster_template.pptx
@@ -120,6 +120,26 @@
             <a:srgbClr val="A4A3A4"/>
           </p15:clr>
         </p15:guide>
+        <p15:guide id="3" pos="576" userDrawn="1">
+          <p15:clr>
+            <a:srgbClr val="A4A3A4"/>
+          </p15:clr>
+        </p15:guide>
+        <p15:guide id="4" pos="6336" userDrawn="1">
+          <p15:clr>
+            <a:srgbClr val="A4A3A4"/>
+          </p15:clr>
+        </p15:guide>
+        <p15:guide id="5" pos="7488" userDrawn="1">
+          <p15:clr>
+            <a:srgbClr val="A4A3A4"/>
+          </p15:clr>
+        </p15:guide>
+        <p15:guide id="6" pos="13248" userDrawn="1">
+          <p15:clr>
+            <a:srgbClr val="A4A3A4"/>
+          </p15:clr>
+        </p15:guide>
       </p15:sldGuideLst>
     </p:ext>
     <p:ext uri="{2D200454-40CA-4A62-9FC3-DE9A4176ACB9}">
@@ -211,7 +231,7 @@
           <a:p>
             <a:fld id="{AF7FB279-EAE1-476A-9F41-43063A731B82}" type="datetimeFigureOut">
               <a:rPr lang="en-US" smtClean="0"/>
-              <a:t>3/28/18</a:t>
+              <a:t>2/25/19</a:t>
             </a:fld>
             <a:endParaRPr lang="en-US"/>
           </a:p>
@@ -750,7 +770,7 @@
             <a:fld id="{6E745FD6-2EE0-4B51-BDA4-4F029209A553}" type="datetimeFigureOut">
               <a:rPr lang="en-US" smtClean="0"/>
               <a:pPr/>
-              <a:t>3/28/18</a:t>
+              <a:t>2/25/19</a:t>
             </a:fld>
             <a:endParaRPr lang="en-US"/>
           </a:p>
@@ -929,7 +949,7 @@
             <a:fld id="{6E745FD6-2EE0-4B51-BDA4-4F029209A553}" type="datetimeFigureOut">
               <a:rPr lang="en-US" smtClean="0"/>
               <a:pPr/>
-              <a:t>3/28/18</a:t>
+              <a:t>2/25/19</a:t>
             </a:fld>
             <a:endParaRPr lang="en-US"/>
           </a:p>
@@ -1111,7 +1131,7 @@
             <a:fld id="{6E745FD6-2EE0-4B51-BDA4-4F029209A553}" type="datetimeFigureOut">
               <a:rPr lang="en-US" smtClean="0"/>
               <a:pPr/>
-              <a:t>3/28/18</a:t>
+              <a:t>2/25/19</a:t>
             </a:fld>
             <a:endParaRPr lang="en-US"/>
           </a:p>
@@ -1283,7 +1303,7 @@
             <a:fld id="{6E745FD6-2EE0-4B51-BDA4-4F029209A553}" type="datetimeFigureOut">
               <a:rPr lang="en-US" smtClean="0"/>
               <a:pPr/>
-              <a:t>3/28/18</a:t>
+              <a:t>2/25/19</a:t>
             </a:fld>
             <a:endParaRPr lang="en-US"/>
           </a:p>
@@ -1531,7 +1551,7 @@
             <a:fld id="{6E745FD6-2EE0-4B51-BDA4-4F029209A553}" type="datetimeFigureOut">
               <a:rPr lang="en-US" smtClean="0"/>
               <a:pPr/>
-              <a:t>3/28/18</a:t>
+              <a:t>2/25/19</a:t>
             </a:fld>
             <a:endParaRPr lang="en-US"/>
           </a:p>
@@ -1821,7 +1841,7 @@
             <a:fld id="{6E745FD6-2EE0-4B51-BDA4-4F029209A553}" type="datetimeFigureOut">
               <a:rPr lang="en-US" smtClean="0"/>
               <a:pPr/>
-              <a:t>3/28/18</a:t>
+              <a:t>2/25/19</a:t>
             </a:fld>
             <a:endParaRPr lang="en-US"/>
           </a:p>
@@ -2250,7 +2270,7 @@
             <a:fld id="{6E745FD6-2EE0-4B51-BDA4-4F029209A553}" type="datetimeFigureOut">
               <a:rPr lang="en-US" smtClean="0"/>
               <a:pPr/>
-              <a:t>3/28/18</a:t>
+              <a:t>2/25/19</a:t>
             </a:fld>
             <a:endParaRPr lang="en-US"/>
           </a:p>
@@ -2370,7 +2390,7 @@
             <a:fld id="{6E745FD6-2EE0-4B51-BDA4-4F029209A553}" type="datetimeFigureOut">
               <a:rPr lang="en-US" smtClean="0"/>
               <a:pPr/>
-              <a:t>3/28/18</a:t>
+              <a:t>2/25/19</a:t>
             </a:fld>
             <a:endParaRPr lang="en-US"/>
           </a:p>
@@ -2467,7 +2487,7 @@
             <a:fld id="{6E745FD6-2EE0-4B51-BDA4-4F029209A553}" type="datetimeFigureOut">
               <a:rPr lang="en-US" smtClean="0"/>
               <a:pPr/>
-              <a:t>3/28/18</a:t>
+              <a:t>2/25/19</a:t>
             </a:fld>
             <a:endParaRPr lang="en-US"/>
           </a:p>
@@ -2746,7 +2766,7 @@
             <a:fld id="{6E745FD6-2EE0-4B51-BDA4-4F029209A553}" type="datetimeFigureOut">
               <a:rPr lang="en-US" smtClean="0"/>
               <a:pPr/>
-              <a:t>3/28/18</a:t>
+              <a:t>2/25/19</a:t>
             </a:fld>
             <a:endParaRPr lang="en-US"/>
           </a:p>
@@ -3001,7 +3021,7 @@
             <a:fld id="{6E745FD6-2EE0-4B51-BDA4-4F029209A553}" type="datetimeFigureOut">
               <a:rPr lang="en-US" smtClean="0"/>
               <a:pPr/>
-              <a:t>3/28/18</a:t>
+              <a:t>2/25/19</a:t>
             </a:fld>
             <a:endParaRPr lang="en-US"/>
           </a:p>
@@ -3216,7 +3236,7 @@
             <a:fld id="{6E745FD6-2EE0-4B51-BDA4-4F029209A553}" type="datetimeFigureOut">
               <a:rPr lang="en-US" smtClean="0"/>
               <a:pPr/>
-              <a:t>3/28/18</a:t>
+              <a:t>2/25/19</a:t>
             </a:fld>
             <a:endParaRPr lang="en-US"/>
           </a:p>
@@ -3600,7 +3620,7 @@
         </p:nvSpPr>
         <p:spPr>
           <a:xfrm>
-            <a:off x="0" y="1981201"/>
+            <a:off x="33528" y="2010740"/>
             <a:ext cx="21945600" cy="3231761"/>
           </a:xfrm>
           <a:prstGeom prst="rect">
@@ -3793,7 +3813,7 @@
         </p:blipFill>
         <p:spPr>
           <a:xfrm>
-            <a:off x="19202400" y="30175200"/>
+            <a:off x="19126200" y="30712593"/>
             <a:ext cx="2177449" cy="2190567"/>
           </a:xfrm>
           <a:prstGeom prst="rect">
@@ -3833,18 +3853,7 @@
                 <a:ea typeface="DIN Condensed" charset="0"/>
                 <a:cs typeface="DIN Condensed" charset="0"/>
               </a:rPr>
-              <a:t>Software Project Title Software Project </a:t>
-            </a:r>
-            <a:r>
-              <a:rPr lang="en-US" sz="5400" spc="300" dirty="0" smtClean="0">
-                <a:solidFill>
-                  <a:srgbClr val="EF0810"/>
-                </a:solidFill>
-                <a:latin typeface="DIN Condensed" charset="0"/>
-                <a:ea typeface="DIN Condensed" charset="0"/>
-                <a:cs typeface="DIN Condensed" charset="0"/>
-              </a:rPr>
-              <a:t>Title</a:t>
+              <a:t>Software Project Title Software Project Title</a:t>
             </a:r>
           </a:p>
           <a:p>
@@ -3895,83 +3904,93 @@
               </a:rPr>
               <a:t>Software Scientist Mentor: Name Here</a:t>
             </a:r>
-            <a:endParaRPr lang="en-US" sz="2400" b="1" dirty="0" smtClean="0">
-              <a:latin typeface="DIN" charset="0"/>
-              <a:ea typeface="DIN" charset="0"/>
-              <a:cs typeface="DIN" charset="0"/>
-            </a:endParaRPr>
-          </a:p>
-        </p:txBody>
-      </p:sp>
-      <p:cxnSp>
-        <p:nvCxnSpPr>
-          <p:cNvPr id="10" name="Straight Connector 9"/>
-          <p:cNvCxnSpPr/>
+          </a:p>
+        </p:txBody>
+      </p:sp>
+      <p:grpSp>
+        <p:nvGrpSpPr>
+          <p:cNvPr id="8" name="Group 7"/>
+          <p:cNvGrpSpPr/>
           <p:nvPr/>
-        </p:nvCxnSpPr>
-        <p:spPr>
-          <a:xfrm>
-            <a:off x="914400" y="5943600"/>
-            <a:ext cx="9144000" cy="0"/>
-          </a:xfrm>
-          <a:prstGeom prst="line">
-            <a:avLst/>
-          </a:prstGeom>
-          <a:ln w="25400"/>
-        </p:spPr>
-        <p:style>
-          <a:lnRef idx="1">
-            <a:schemeClr val="dk1"/>
-          </a:lnRef>
-          <a:fillRef idx="0">
-            <a:schemeClr val="dk1"/>
-          </a:fillRef>
-          <a:effectRef idx="0">
-            <a:schemeClr val="dk1"/>
-          </a:effectRef>
-          <a:fontRef idx="minor">
-            <a:schemeClr val="tx1"/>
-          </a:fontRef>
-        </p:style>
-      </p:cxnSp>
-      <p:sp>
-        <p:nvSpPr>
-          <p:cNvPr id="11" name="TextBox 10"/>
-          <p:cNvSpPr txBox="1"/>
-          <p:nvPr/>
-        </p:nvSpPr>
-        <p:spPr>
+        </p:nvGrpSpPr>
+        <p:grpSpPr>
           <a:xfrm>
             <a:off x="862988" y="5174159"/>
             <a:ext cx="9195412" cy="769441"/>
+            <a:chOff x="862988" y="5174159"/>
+            <a:chExt cx="9195412" cy="769441"/>
           </a:xfrm>
-          <a:prstGeom prst="rect">
-            <a:avLst/>
-          </a:prstGeom>
-          <a:noFill/>
-        </p:spPr>
-        <p:txBody>
-          <a:bodyPr wrap="square" rtlCol="0">
-            <a:spAutoFit/>
-          </a:bodyPr>
-          <a:lstStyle/>
-          <a:p>
-            <a:r>
-              <a:rPr lang="en-US" sz="4400" spc="300" dirty="0" smtClean="0">
+        </p:grpSpPr>
+        <p:cxnSp>
+          <p:nvCxnSpPr>
+            <p:cNvPr id="10" name="Straight Connector 9"/>
+            <p:cNvCxnSpPr/>
+            <p:nvPr/>
+          </p:nvCxnSpPr>
+          <p:spPr>
+            <a:xfrm>
+              <a:off x="914400" y="5943600"/>
+              <a:ext cx="9144000" cy="0"/>
+            </a:xfrm>
+            <a:prstGeom prst="line">
+              <a:avLst/>
+            </a:prstGeom>
+            <a:ln w="25400"/>
+          </p:spPr>
+          <p:style>
+            <a:lnRef idx="1">
+              <a:schemeClr val="dk1"/>
+            </a:lnRef>
+            <a:fillRef idx="0">
+              <a:schemeClr val="dk1"/>
+            </a:fillRef>
+            <a:effectRef idx="0">
+              <a:schemeClr val="dk1"/>
+            </a:effectRef>
+            <a:fontRef idx="minor">
+              <a:schemeClr val="tx1"/>
+            </a:fontRef>
+          </p:style>
+        </p:cxnSp>
+        <p:sp>
+          <p:nvSpPr>
+            <p:cNvPr id="11" name="TextBox 10"/>
+            <p:cNvSpPr txBox="1"/>
+            <p:nvPr/>
+          </p:nvSpPr>
+          <p:spPr>
+            <a:xfrm>
+              <a:off x="862988" y="5174159"/>
+              <a:ext cx="9195412" cy="769441"/>
+            </a:xfrm>
+            <a:prstGeom prst="rect">
+              <a:avLst/>
+            </a:prstGeom>
+            <a:noFill/>
+          </p:spPr>
+          <p:txBody>
+            <a:bodyPr wrap="square" rtlCol="0">
+              <a:spAutoFit/>
+            </a:bodyPr>
+            <a:lstStyle/>
+            <a:p>
+              <a:r>
+                <a:rPr lang="en-US" sz="4400" spc="300" dirty="0" smtClean="0">
+                  <a:latin typeface="DIN Condensed" charset="0"/>
+                  <a:ea typeface="DIN Condensed" charset="0"/>
+                  <a:cs typeface="DIN Condensed" charset="0"/>
+                </a:rPr>
+                <a:t>Section Title</a:t>
+              </a:r>
+              <a:endParaRPr lang="en-US" sz="4400" spc="300" dirty="0">
                 <a:latin typeface="DIN Condensed" charset="0"/>
                 <a:ea typeface="DIN Condensed" charset="0"/>
                 <a:cs typeface="DIN Condensed" charset="0"/>
-              </a:rPr>
-              <a:t>Section Title</a:t>
-            </a:r>
-            <a:endParaRPr lang="en-US" sz="4400" spc="300" dirty="0">
-              <a:latin typeface="DIN Condensed" charset="0"/>
-              <a:ea typeface="DIN Condensed" charset="0"/>
-              <a:cs typeface="DIN Condensed" charset="0"/>
-            </a:endParaRPr>
-          </a:p>
-        </p:txBody>
-      </p:sp>
+              </a:endParaRPr>
+            </a:p>
+          </p:txBody>
+        </p:sp>
+      </p:grpSp>
       <p:sp>
         <p:nvSpPr>
           <p:cNvPr id="13" name="TextBox 12"/>
@@ -4144,6 +4163,177 @@
           </a:p>
         </p:txBody>
       </p:sp>
+      <p:sp>
+        <p:nvSpPr>
+          <p:cNvPr id="12" name="TextBox 11"/>
+          <p:cNvSpPr txBox="1"/>
+          <p:nvPr/>
+        </p:nvSpPr>
+        <p:spPr>
+          <a:xfrm>
+            <a:off x="11811000" y="30212447"/>
+            <a:ext cx="8229600" cy="1323439"/>
+          </a:xfrm>
+          <a:prstGeom prst="rect">
+            <a:avLst/>
+          </a:prstGeom>
+          <a:noFill/>
+        </p:spPr>
+        <p:txBody>
+          <a:bodyPr wrap="square" rtlCol="0">
+            <a:spAutoFit/>
+          </a:bodyPr>
+          <a:lstStyle/>
+          <a:p>
+            <a:r>
+              <a:rPr lang="en-US" sz="2000" dirty="0" smtClean="0">
+                <a:latin typeface="DIN" charset="0"/>
+                <a:ea typeface="DIN" charset="0"/>
+                <a:cs typeface="DIN" charset="0"/>
+              </a:rPr>
+              <a:t>Software </a:t>
+            </a:r>
+            <a:r>
+              <a:rPr lang="en-US" sz="2000" dirty="0">
+                <a:latin typeface="DIN" charset="0"/>
+                <a:ea typeface="DIN" charset="0"/>
+                <a:cs typeface="DIN" charset="0"/>
+              </a:rPr>
+              <a:t>Fellow Name</a:t>
+            </a:r>
+            <a:r>
+              <a:rPr lang="en-US" sz="2000" dirty="0">
+                <a:latin typeface="DIN" charset="0"/>
+                <a:ea typeface="DIN" charset="0"/>
+                <a:cs typeface="DIN" charset="0"/>
+              </a:rPr>
+              <a:t> was supported by a fellowship from The Molecular Sciences Software Institute under NSF grant </a:t>
+            </a:r>
+            <a:r>
+              <a:rPr lang="en-US" sz="2000" dirty="0" smtClean="0">
+                <a:latin typeface="DIN" charset="0"/>
+                <a:ea typeface="DIN" charset="0"/>
+                <a:cs typeface="DIN" charset="0"/>
+              </a:rPr>
+              <a:t>ACI-1547580</a:t>
+            </a:r>
+          </a:p>
+          <a:p>
+            <a:endParaRPr lang="en-US" sz="2000" dirty="0">
+              <a:latin typeface="DIN" charset="0"/>
+              <a:ea typeface="DIN" charset="0"/>
+              <a:cs typeface="DIN" charset="0"/>
+            </a:endParaRPr>
+          </a:p>
+          <a:p>
+            <a:r>
+              <a:rPr lang="en-US" sz="2000" dirty="0" smtClean="0">
+                <a:latin typeface="DIN" charset="0"/>
+                <a:ea typeface="DIN" charset="0"/>
+                <a:cs typeface="DIN" charset="0"/>
+              </a:rPr>
+              <a:t>* Other funding acknowledgements</a:t>
+            </a:r>
+            <a:endParaRPr lang="en-US" sz="2000" dirty="0">
+              <a:latin typeface="DIN" charset="0"/>
+              <a:ea typeface="DIN" charset="0"/>
+              <a:cs typeface="DIN" charset="0"/>
+            </a:endParaRPr>
+          </a:p>
+        </p:txBody>
+      </p:sp>
+      <p:grpSp>
+        <p:nvGrpSpPr>
+          <p:cNvPr id="3" name="Group 2"/>
+          <p:cNvGrpSpPr/>
+          <p:nvPr/>
+        </p:nvGrpSpPr>
+        <p:grpSpPr>
+          <a:xfrm>
+            <a:off x="11811000" y="29351216"/>
+            <a:ext cx="9195412" cy="769441"/>
+            <a:chOff x="10921388" y="28813823"/>
+            <a:chExt cx="9195412" cy="769441"/>
+          </a:xfrm>
+        </p:grpSpPr>
+        <p:cxnSp>
+          <p:nvCxnSpPr>
+            <p:cNvPr id="16" name="Straight Connector 15"/>
+            <p:cNvCxnSpPr/>
+            <p:nvPr/>
+          </p:nvCxnSpPr>
+          <p:spPr>
+            <a:xfrm>
+              <a:off x="10972800" y="29583264"/>
+              <a:ext cx="9144000" cy="0"/>
+            </a:xfrm>
+            <a:prstGeom prst="line">
+              <a:avLst/>
+            </a:prstGeom>
+            <a:ln w="25400"/>
+          </p:spPr>
+          <p:style>
+            <a:lnRef idx="1">
+              <a:schemeClr val="dk1"/>
+            </a:lnRef>
+            <a:fillRef idx="0">
+              <a:schemeClr val="dk1"/>
+            </a:fillRef>
+            <a:effectRef idx="0">
+              <a:schemeClr val="dk1"/>
+            </a:effectRef>
+            <a:fontRef idx="minor">
+              <a:schemeClr val="tx1"/>
+            </a:fontRef>
+          </p:style>
+        </p:cxnSp>
+        <p:sp>
+          <p:nvSpPr>
+            <p:cNvPr id="17" name="TextBox 16"/>
+            <p:cNvSpPr txBox="1"/>
+            <p:nvPr/>
+          </p:nvSpPr>
+          <p:spPr>
+            <a:xfrm>
+              <a:off x="10921388" y="28813823"/>
+              <a:ext cx="9195412" cy="769441"/>
+            </a:xfrm>
+            <a:prstGeom prst="rect">
+              <a:avLst/>
+            </a:prstGeom>
+            <a:noFill/>
+          </p:spPr>
+          <p:txBody>
+            <a:bodyPr wrap="square" rtlCol="0">
+              <a:spAutoFit/>
+            </a:bodyPr>
+            <a:lstStyle/>
+            <a:p>
+              <a:r>
+                <a:rPr lang="en-US" sz="4400" spc="300" dirty="0" smtClean="0">
+                  <a:latin typeface="DIN Condensed" charset="0"/>
+                  <a:ea typeface="DIN Condensed" charset="0"/>
+                  <a:cs typeface="DIN Condensed" charset="0"/>
+                </a:rPr>
+                <a:t>Ackn</a:t>
+              </a:r>
+              <a:r>
+                <a:rPr lang="en-US" sz="4400" spc="300" dirty="0" smtClean="0">
+                  <a:latin typeface="DIN Condensed" charset="0"/>
+                  <a:ea typeface="DIN Condensed" charset="0"/>
+                  <a:cs typeface="DIN Condensed" charset="0"/>
+                </a:rPr>
+                <a:t>owledgements</a:t>
+              </a:r>
+              <a:endParaRPr lang="en-US" sz="4400" spc="300" dirty="0">
+                <a:latin typeface="DIN Condensed" charset="0"/>
+                <a:ea typeface="DIN Condensed" charset="0"/>
+                <a:cs typeface="DIN Condensed" charset="0"/>
+              </a:endParaRPr>
+            </a:p>
+          </p:txBody>
+        </p:sp>
+      </p:grpSp>
     </p:spTree>
     <p:extLst>
       <p:ext uri="{BB962C8B-B14F-4D97-AF65-F5344CB8AC3E}">

</xml_diff>